<commit_message>
updated printables for easier printing
</commit_message>
<xml_diff>
--- a/Printables/Blank.pptx
+++ b/Printables/Blank.pptx
@@ -197,7 +197,7 @@
           <a:p>
             <a:fld id="{9C98580C-D285-4F41-9F7C-827133E32D3F}" type="datetimeFigureOut">
               <a:rPr lang="en-US" smtClean="0"/>
-              <a:t>3/3/24</a:t>
+              <a:t>11/13/24</a:t>
             </a:fld>
             <a:endParaRPr lang="en-US"/>
           </a:p>
@@ -611,7 +611,7 @@
           <a:p>
             <a:fld id="{6673748A-CFCB-6043-A763-01F8534D618B}" type="datetimeFigureOut">
               <a:rPr lang="en-US" smtClean="0"/>
-              <a:t>3/3/24</a:t>
+              <a:t>11/13/24</a:t>
             </a:fld>
             <a:endParaRPr lang="en-US"/>
           </a:p>
@@ -809,7 +809,7 @@
           <a:p>
             <a:fld id="{6673748A-CFCB-6043-A763-01F8534D618B}" type="datetimeFigureOut">
               <a:rPr lang="en-US" smtClean="0"/>
-              <a:t>3/3/24</a:t>
+              <a:t>11/13/24</a:t>
             </a:fld>
             <a:endParaRPr lang="en-US"/>
           </a:p>
@@ -1017,7 +1017,7 @@
           <a:p>
             <a:fld id="{6673748A-CFCB-6043-A763-01F8534D618B}" type="datetimeFigureOut">
               <a:rPr lang="en-US" smtClean="0"/>
-              <a:t>3/3/24</a:t>
+              <a:t>11/13/24</a:t>
             </a:fld>
             <a:endParaRPr lang="en-US"/>
           </a:p>
@@ -1215,7 +1215,7 @@
           <a:p>
             <a:fld id="{6673748A-CFCB-6043-A763-01F8534D618B}" type="datetimeFigureOut">
               <a:rPr lang="en-US" smtClean="0"/>
-              <a:t>3/3/24</a:t>
+              <a:t>11/13/24</a:t>
             </a:fld>
             <a:endParaRPr lang="en-US"/>
           </a:p>
@@ -1490,7 +1490,7 @@
           <a:p>
             <a:fld id="{6673748A-CFCB-6043-A763-01F8534D618B}" type="datetimeFigureOut">
               <a:rPr lang="en-US" smtClean="0"/>
-              <a:t>3/3/24</a:t>
+              <a:t>11/13/24</a:t>
             </a:fld>
             <a:endParaRPr lang="en-US"/>
           </a:p>
@@ -1755,7 +1755,7 @@
           <a:p>
             <a:fld id="{6673748A-CFCB-6043-A763-01F8534D618B}" type="datetimeFigureOut">
               <a:rPr lang="en-US" smtClean="0"/>
-              <a:t>3/3/24</a:t>
+              <a:t>11/13/24</a:t>
             </a:fld>
             <a:endParaRPr lang="en-US"/>
           </a:p>
@@ -2167,7 +2167,7 @@
           <a:p>
             <a:fld id="{6673748A-CFCB-6043-A763-01F8534D618B}" type="datetimeFigureOut">
               <a:rPr lang="en-US" smtClean="0"/>
-              <a:t>3/3/24</a:t>
+              <a:t>11/13/24</a:t>
             </a:fld>
             <a:endParaRPr lang="en-US"/>
           </a:p>
@@ -2308,7 +2308,7 @@
           <a:p>
             <a:fld id="{6673748A-CFCB-6043-A763-01F8534D618B}" type="datetimeFigureOut">
               <a:rPr lang="en-US" smtClean="0"/>
-              <a:t>3/3/24</a:t>
+              <a:t>11/13/24</a:t>
             </a:fld>
             <a:endParaRPr lang="en-US"/>
           </a:p>
@@ -2421,7 +2421,7 @@
           <a:p>
             <a:fld id="{6673748A-CFCB-6043-A763-01F8534D618B}" type="datetimeFigureOut">
               <a:rPr lang="en-US" smtClean="0"/>
-              <a:t>3/3/24</a:t>
+              <a:t>11/13/24</a:t>
             </a:fld>
             <a:endParaRPr lang="en-US"/>
           </a:p>
@@ -2732,7 +2732,7 @@
           <a:p>
             <a:fld id="{6673748A-CFCB-6043-A763-01F8534D618B}" type="datetimeFigureOut">
               <a:rPr lang="en-US" smtClean="0"/>
-              <a:t>3/3/24</a:t>
+              <a:t>11/13/24</a:t>
             </a:fld>
             <a:endParaRPr lang="en-US"/>
           </a:p>
@@ -3020,7 +3020,7 @@
           <a:p>
             <a:fld id="{6673748A-CFCB-6043-A763-01F8534D618B}" type="datetimeFigureOut">
               <a:rPr lang="en-US" smtClean="0"/>
-              <a:t>3/3/24</a:t>
+              <a:t>11/13/24</a:t>
             </a:fld>
             <a:endParaRPr lang="en-US"/>
           </a:p>
@@ -3261,7 +3261,7 @@
           <a:p>
             <a:fld id="{6673748A-CFCB-6043-A763-01F8534D618B}" type="datetimeFigureOut">
               <a:rPr lang="en-US" smtClean="0"/>
-              <a:t>3/3/24</a:t>
+              <a:t>11/13/24</a:t>
             </a:fld>
             <a:endParaRPr lang="en-US"/>
           </a:p>
@@ -3740,7 +3740,7 @@
         </p:nvSpPr>
         <p:spPr>
           <a:xfrm>
-            <a:off x="202032" y="3631441"/>
+            <a:off x="202033" y="3333303"/>
             <a:ext cx="3660791" cy="3155854"/>
           </a:xfrm>
           <a:prstGeom prst="hexagon">
@@ -3788,7 +3788,7 @@
         </p:nvSpPr>
         <p:spPr>
           <a:xfrm>
-            <a:off x="4002554" y="3631441"/>
+            <a:off x="3896227" y="3333303"/>
             <a:ext cx="3660791" cy="3155854"/>
           </a:xfrm>
           <a:prstGeom prst="hexagon">
@@ -3836,7 +3836,7 @@
         </p:nvSpPr>
         <p:spPr>
           <a:xfrm>
-            <a:off x="7803075" y="70705"/>
+            <a:off x="7590421" y="177449"/>
             <a:ext cx="3660791" cy="3155854"/>
           </a:xfrm>
           <a:prstGeom prst="hexagon">
@@ -3884,7 +3884,7 @@
         </p:nvSpPr>
         <p:spPr>
           <a:xfrm>
-            <a:off x="4002554" y="70705"/>
+            <a:off x="3896227" y="102603"/>
             <a:ext cx="3660791" cy="3155854"/>
           </a:xfrm>
           <a:prstGeom prst="hexagon">
@@ -3932,7 +3932,7 @@
         </p:nvSpPr>
         <p:spPr>
           <a:xfrm>
-            <a:off x="7803074" y="3631441"/>
+            <a:off x="7590421" y="3339042"/>
             <a:ext cx="3660791" cy="3155854"/>
           </a:xfrm>
           <a:prstGeom prst="hexagon">

</xml_diff>